<commit_message>
i add new information 14
</commit_message>
<xml_diff>
--- a/Проект курсовой/КУРСОВАЯ РАБОТА по МДК 01.pptx
+++ b/Проект курсовой/КУРСОВАЯ РАБОТА по МДК 01.pptx
@@ -14,6 +14,10 @@
     <p:sldId id="262" r:id="rId8"/>
     <p:sldId id="263" r:id="rId9"/>
     <p:sldId id="264" r:id="rId10"/>
+    <p:sldId id="266" r:id="rId11"/>
+    <p:sldId id="267" r:id="rId12"/>
+    <p:sldId id="268" r:id="rId13"/>
+    <p:sldId id="265" r:id="rId14"/>
   </p:sldIdLst>
   <p:sldSz cx="12192000" cy="6858000"/>
   <p:notesSz cx="6858000" cy="9144000"/>
@@ -259,7 +263,7 @@
           <a:p>
             <a:fld id="{48A87A34-81AB-432B-8DAE-1953F412C126}" type="datetimeFigureOut">
               <a:rPr lang="en-US" dirty="0"/>
-              <a:t>5/3/2022</a:t>
+              <a:t>5/4/2022</a:t>
             </a:fld>
             <a:endParaRPr lang="en-US" dirty="0"/>
           </a:p>
@@ -465,7 +469,7 @@
           <a:p>
             <a:fld id="{48A87A34-81AB-432B-8DAE-1953F412C126}" type="datetimeFigureOut">
               <a:rPr lang="en-US" dirty="0"/>
-              <a:t>5/3/2022</a:t>
+              <a:t>5/4/2022</a:t>
             </a:fld>
             <a:endParaRPr lang="en-US" dirty="0"/>
           </a:p>
@@ -675,7 +679,7 @@
           <a:p>
             <a:fld id="{48A87A34-81AB-432B-8DAE-1953F412C126}" type="datetimeFigureOut">
               <a:rPr lang="en-US" dirty="0"/>
-              <a:t>5/3/2022</a:t>
+              <a:t>5/4/2022</a:t>
             </a:fld>
             <a:endParaRPr lang="en-US" dirty="0"/>
           </a:p>
@@ -871,7 +875,7 @@
           <a:p>
             <a:fld id="{48A87A34-81AB-432B-8DAE-1953F412C126}" type="datetimeFigureOut">
               <a:rPr lang="en-US" dirty="0"/>
-              <a:t>5/3/2022</a:t>
+              <a:t>5/4/2022</a:t>
             </a:fld>
             <a:endParaRPr lang="en-US" dirty="0"/>
           </a:p>
@@ -1145,7 +1149,7 @@
           <a:p>
             <a:fld id="{48A87A34-81AB-432B-8DAE-1953F412C126}" type="datetimeFigureOut">
               <a:rPr lang="en-US" dirty="0"/>
-              <a:t>5/3/2022</a:t>
+              <a:t>5/4/2022</a:t>
             </a:fld>
             <a:endParaRPr lang="en-US" dirty="0"/>
           </a:p>
@@ -1408,7 +1412,7 @@
           <a:p>
             <a:fld id="{48A87A34-81AB-432B-8DAE-1953F412C126}" type="datetimeFigureOut">
               <a:rPr lang="en-US" dirty="0"/>
-              <a:t>5/3/2022</a:t>
+              <a:t>5/4/2022</a:t>
             </a:fld>
             <a:endParaRPr lang="en-US" dirty="0"/>
           </a:p>
@@ -1819,7 +1823,7 @@
           <a:p>
             <a:fld id="{48A87A34-81AB-432B-8DAE-1953F412C126}" type="datetimeFigureOut">
               <a:rPr lang="en-US" dirty="0"/>
-              <a:t>5/3/2022</a:t>
+              <a:t>5/4/2022</a:t>
             </a:fld>
             <a:endParaRPr lang="en-US" dirty="0"/>
           </a:p>
@@ -1963,7 +1967,7 @@
           <a:p>
             <a:fld id="{48A87A34-81AB-432B-8DAE-1953F412C126}" type="datetimeFigureOut">
               <a:rPr lang="en-US" dirty="0"/>
-              <a:t>5/3/2022</a:t>
+              <a:t>5/4/2022</a:t>
             </a:fld>
             <a:endParaRPr lang="en-US" dirty="0"/>
           </a:p>
@@ -2084,7 +2088,7 @@
           <a:p>
             <a:fld id="{48A87A34-81AB-432B-8DAE-1953F412C126}" type="datetimeFigureOut">
               <a:rPr lang="en-US" dirty="0"/>
-              <a:t>5/3/2022</a:t>
+              <a:t>5/4/2022</a:t>
             </a:fld>
             <a:endParaRPr lang="en-US" dirty="0"/>
           </a:p>
@@ -2330,7 +2334,7 @@
           <a:p>
             <a:fld id="{48A87A34-81AB-432B-8DAE-1953F412C126}" type="datetimeFigureOut">
               <a:rPr lang="en-US" dirty="0"/>
-              <a:t>5/3/2022</a:t>
+              <a:t>5/4/2022</a:t>
             </a:fld>
             <a:endParaRPr lang="en-US" dirty="0"/>
           </a:p>
@@ -2771,7 +2775,7 @@
             <a:fld id="{48A87A34-81AB-432B-8DAE-1953F412C126}" type="datetimeFigureOut">
               <a:rPr lang="en-US" dirty="0"/>
               <a:pPr/>
-              <a:t>5/3/2022</a:t>
+              <a:t>5/4/2022</a:t>
             </a:fld>
             <a:endParaRPr lang="en-US" dirty="0"/>
           </a:p>
@@ -3094,7 +3098,7 @@
             <a:fld id="{48A87A34-81AB-432B-8DAE-1953F412C126}" type="datetimeFigureOut">
               <a:rPr lang="en-US" dirty="0"/>
               <a:pPr/>
-              <a:t>5/3/2022</a:t>
+              <a:t>5/4/2022</a:t>
             </a:fld>
             <a:endParaRPr lang="en-US" dirty="0"/>
           </a:p>
@@ -3594,7 +3598,7 @@
         </p:nvSpPr>
         <p:spPr>
           <a:xfrm>
-            <a:off x="591899" y="144702"/>
+            <a:off x="864523" y="228124"/>
             <a:ext cx="10462952" cy="2492990"/>
           </a:xfrm>
         </p:spPr>
@@ -3613,7 +3617,7 @@
               </a:spcAft>
             </a:pPr>
             <a:r>
-              <a:rPr lang="ru-RU" sz="1800" dirty="0">
+              <a:rPr lang="ru-RU" sz="2000" dirty="0">
                 <a:effectLst/>
                 <a:latin typeface="Times New Roman" panose="02020603050405020304" pitchFamily="18" charset="0"/>
                 <a:ea typeface="Times New Roman" panose="02020603050405020304" pitchFamily="18" charset="0"/>
@@ -3621,14 +3625,14 @@
               <a:t>КУРСОВАЯ РАБОТА по МДК 01.02  Методы и средства проектирования информационной системы</a:t>
             </a:r>
             <a:r>
-              <a:rPr lang="ru-RU" sz="1800" dirty="0">
+              <a:rPr lang="ru-RU" sz="2000" dirty="0">
                 <a:latin typeface="Arial" panose="020B0604020202020204" pitchFamily="34" charset="0"/>
                 <a:ea typeface="Times New Roman" panose="02020603050405020304" pitchFamily="18" charset="0"/>
               </a:rPr>
               <a:t> </a:t>
             </a:r>
             <a:r>
-              <a:rPr lang="ru-RU" sz="1800" dirty="0">
+              <a:rPr lang="ru-RU" sz="2000" dirty="0">
                 <a:effectLst/>
                 <a:latin typeface="Times New Roman" panose="02020603050405020304" pitchFamily="18" charset="0"/>
                 <a:ea typeface="Times New Roman" panose="02020603050405020304" pitchFamily="18" charset="0"/>
@@ -3636,14 +3640,14 @@
               <a:t>по теме: </a:t>
             </a:r>
             <a:br>
-              <a:rPr lang="ru-RU" sz="1800" dirty="0">
+              <a:rPr lang="ru-RU" sz="2000" dirty="0">
                 <a:effectLst/>
                 <a:latin typeface="Arial" panose="020B0604020202020204" pitchFamily="34" charset="0"/>
                 <a:ea typeface="Arial" panose="020B0604020202020204" pitchFamily="34" charset="0"/>
               </a:rPr>
             </a:br>
             <a:r>
-              <a:rPr lang="ru-RU" sz="1800" dirty="0">
+              <a:rPr lang="ru-RU" sz="2000" dirty="0">
                 <a:effectLst/>
                 <a:latin typeface="Times New Roman" panose="02020603050405020304" pitchFamily="18" charset="0"/>
                 <a:ea typeface="Times New Roman" panose="02020603050405020304" pitchFamily="18" charset="0"/>
@@ -3651,14 +3655,14 @@
               <a:t>Проектирование автоматизированной информационной системы </a:t>
             </a:r>
             <a:br>
-              <a:rPr lang="ru-RU" sz="1800" dirty="0">
+              <a:rPr lang="ru-RU" sz="2000" dirty="0">
                 <a:effectLst/>
                 <a:latin typeface="Times New Roman" panose="02020603050405020304" pitchFamily="18" charset="0"/>
                 <a:ea typeface="Times New Roman" panose="02020603050405020304" pitchFamily="18" charset="0"/>
               </a:rPr>
             </a:br>
             <a:r>
-              <a:rPr lang="ru-RU" sz="1800" dirty="0">
+              <a:rPr lang="ru-RU" sz="2000" dirty="0">
                 <a:effectLst/>
                 <a:latin typeface="Times New Roman" panose="02020603050405020304" pitchFamily="18" charset="0"/>
                 <a:ea typeface="Times New Roman" panose="02020603050405020304" pitchFamily="18" charset="0"/>
@@ -3872,6 +3876,665 @@
     <p:extLst>
       <p:ext uri="{BB962C8B-B14F-4D97-AF65-F5344CB8AC3E}">
         <p14:creationId xmlns:p14="http://schemas.microsoft.com/office/powerpoint/2010/main" val="493602099"/>
+      </p:ext>
+    </p:extLst>
+  </p:cSld>
+  <p:clrMapOvr>
+    <a:masterClrMapping/>
+  </p:clrMapOvr>
+</p:sld>
+</file>
+
+<file path=ppt/slides/slide10.xml><?xml version="1.0" encoding="utf-8"?>
+<p:sld xmlns:a="http://schemas.openxmlformats.org/drawingml/2006/main" xmlns:r="http://schemas.openxmlformats.org/officeDocument/2006/relationships" xmlns:p="http://schemas.openxmlformats.org/presentationml/2006/main">
+  <p:cSld>
+    <p:spTree>
+      <p:nvGrpSpPr>
+        <p:cNvPr id="1" name=""/>
+        <p:cNvGrpSpPr/>
+        <p:nvPr/>
+      </p:nvGrpSpPr>
+      <p:grpSpPr>
+        <a:xfrm>
+          <a:off x="0" y="0"/>
+          <a:ext cx="0" cy="0"/>
+          <a:chOff x="0" y="0"/>
+          <a:chExt cx="0" cy="0"/>
+        </a:xfrm>
+      </p:grpSpPr>
+      <p:sp>
+        <p:nvSpPr>
+          <p:cNvPr id="2" name="Заголовок 1">
+            <a:extLst>
+              <a:ext uri="{FF2B5EF4-FFF2-40B4-BE49-F238E27FC236}">
+                <a16:creationId xmlns:a16="http://schemas.microsoft.com/office/drawing/2014/main" id="{A1418FED-D9F9-4900-A4FA-6EB249DDA024}"/>
+              </a:ext>
+            </a:extLst>
+          </p:cNvPr>
+          <p:cNvSpPr>
+            <a:spLocks noGrp="1"/>
+          </p:cNvSpPr>
+          <p:nvPr>
+            <p:ph type="title"/>
+          </p:nvPr>
+        </p:nvSpPr>
+        <p:spPr>
+          <a:xfrm>
+            <a:off x="1451579" y="548840"/>
+            <a:ext cx="9603275" cy="1466892"/>
+          </a:xfrm>
+        </p:spPr>
+        <p:txBody>
+          <a:bodyPr>
+            <a:normAutofit/>
+          </a:bodyPr>
+          <a:lstStyle/>
+          <a:p>
+            <a:pPr algn="ctr"/>
+            <a:r>
+              <a:rPr lang="ru-RU" sz="4000" dirty="0">
+                <a:latin typeface="Times New Roman" panose="02020603050405020304" pitchFamily="18" charset="0"/>
+                <a:cs typeface="Times New Roman" panose="02020603050405020304" pitchFamily="18" charset="0"/>
+              </a:rPr>
+              <a:t>Составление технического задания</a:t>
+            </a:r>
+            <a:endParaRPr lang="ru-RU" sz="4000" dirty="0"/>
+          </a:p>
+        </p:txBody>
+      </p:sp>
+      <p:sp>
+        <p:nvSpPr>
+          <p:cNvPr id="3" name="Объект 2">
+            <a:extLst>
+              <a:ext uri="{FF2B5EF4-FFF2-40B4-BE49-F238E27FC236}">
+                <a16:creationId xmlns:a16="http://schemas.microsoft.com/office/drawing/2014/main" id="{E0422C1F-0A0A-41C0-B15D-B05CB64FC6AE}"/>
+              </a:ext>
+            </a:extLst>
+          </p:cNvPr>
+          <p:cNvSpPr>
+            <a:spLocks noGrp="1"/>
+          </p:cNvSpPr>
+          <p:nvPr>
+            <p:ph idx="1"/>
+          </p:nvPr>
+        </p:nvSpPr>
+        <p:spPr>
+          <a:xfrm>
+            <a:off x="158674" y="2190609"/>
+            <a:ext cx="11637086" cy="3996831"/>
+          </a:xfrm>
+        </p:spPr>
+        <p:txBody>
+          <a:bodyPr>
+            <a:normAutofit/>
+          </a:bodyPr>
+          <a:lstStyle/>
+          <a:p>
+            <a:pPr indent="0" algn="just">
+              <a:lnSpc>
+                <a:spcPct val="150000"/>
+              </a:lnSpc>
+              <a:spcAft>
+                <a:spcPts val="0"/>
+              </a:spcAft>
+              <a:buNone/>
+            </a:pPr>
+            <a:r>
+              <a:rPr lang="ru-RU" sz="1600" dirty="0">
+                <a:effectLst/>
+                <a:latin typeface="Times New Roman" panose="02020603050405020304" pitchFamily="18" charset="0"/>
+                <a:ea typeface="Times New Roman" panose="02020603050405020304" pitchFamily="18" charset="0"/>
+              </a:rPr>
+              <a:t>Подсистема сбора и обработки информации предназначена для внесения и загрузки информации о товарах определённого типа.</a:t>
+            </a:r>
+            <a:endParaRPr lang="ru-RU" sz="1600" dirty="0">
+              <a:effectLst/>
+              <a:latin typeface="Arial" panose="020B0604020202020204" pitchFamily="34" charset="0"/>
+              <a:ea typeface="Arial" panose="020B0604020202020204" pitchFamily="34" charset="0"/>
+            </a:endParaRPr>
+          </a:p>
+          <a:p>
+            <a:pPr indent="0" algn="just">
+              <a:lnSpc>
+                <a:spcPct val="150000"/>
+              </a:lnSpc>
+              <a:spcAft>
+                <a:spcPts val="0"/>
+              </a:spcAft>
+              <a:buNone/>
+            </a:pPr>
+            <a:r>
+              <a:rPr lang="ru-RU" sz="1600" dirty="0">
+                <a:effectLst/>
+                <a:latin typeface="Times New Roman" panose="02020603050405020304" pitchFamily="18" charset="0"/>
+                <a:ea typeface="Times New Roman" panose="02020603050405020304" pitchFamily="18" charset="0"/>
+              </a:rPr>
+              <a:t>Подсистема хранения данных предназначена для хранения оперативных данных о товарах, посетителей, данных для формирования отчётов о товарах.</a:t>
+            </a:r>
+            <a:endParaRPr lang="ru-RU" sz="1600" dirty="0">
+              <a:effectLst/>
+              <a:latin typeface="Arial" panose="020B0604020202020204" pitchFamily="34" charset="0"/>
+              <a:ea typeface="Arial" panose="020B0604020202020204" pitchFamily="34" charset="0"/>
+            </a:endParaRPr>
+          </a:p>
+          <a:p>
+            <a:pPr indent="0" algn="just">
+              <a:lnSpc>
+                <a:spcPct val="150000"/>
+              </a:lnSpc>
+              <a:spcAft>
+                <a:spcPts val="0"/>
+              </a:spcAft>
+              <a:buNone/>
+            </a:pPr>
+            <a:r>
+              <a:rPr lang="ru-RU" sz="1600" dirty="0">
+                <a:effectLst/>
+                <a:latin typeface="Times New Roman" panose="02020603050405020304" pitchFamily="18" charset="0"/>
+                <a:ea typeface="Times New Roman" panose="02020603050405020304" pitchFamily="18" charset="0"/>
+              </a:rPr>
+              <a:t>Подсистема формирования отчётности предназначена для создания и формирования отчётов в виде удобном для вывода на печатающие устройства.  На основе системы АРММ.</a:t>
+            </a:r>
+            <a:endParaRPr lang="ru-RU" sz="1600" dirty="0">
+              <a:effectLst/>
+              <a:latin typeface="Arial" panose="020B0604020202020204" pitchFamily="34" charset="0"/>
+              <a:ea typeface="Arial" panose="020B0604020202020204" pitchFamily="34" charset="0"/>
+            </a:endParaRPr>
+          </a:p>
+          <a:p>
+            <a:pPr indent="0" algn="just">
+              <a:lnSpc>
+                <a:spcPct val="150000"/>
+              </a:lnSpc>
+              <a:spcAft>
+                <a:spcPts val="0"/>
+              </a:spcAft>
+              <a:buNone/>
+            </a:pPr>
+            <a:r>
+              <a:rPr lang="ru-RU" sz="1600" dirty="0">
+                <a:effectLst/>
+                <a:latin typeface="Times New Roman" panose="02020603050405020304" pitchFamily="18" charset="0"/>
+                <a:ea typeface="Times New Roman" panose="02020603050405020304" pitchFamily="18" charset="0"/>
+              </a:rPr>
+              <a:t>Подсистема анализа работы системы предназначена для аналитической работы системы, для быстрого выявления неполадок и багов.</a:t>
+            </a:r>
+            <a:endParaRPr lang="ru-RU" sz="1600" dirty="0">
+              <a:effectLst/>
+              <a:latin typeface="Arial" panose="020B0604020202020204" pitchFamily="34" charset="0"/>
+              <a:ea typeface="Arial" panose="020B0604020202020204" pitchFamily="34" charset="0"/>
+            </a:endParaRPr>
+          </a:p>
+          <a:p>
+            <a:pPr indent="0" algn="just">
+              <a:lnSpc>
+                <a:spcPct val="150000"/>
+              </a:lnSpc>
+              <a:spcAft>
+                <a:spcPts val="0"/>
+              </a:spcAft>
+              <a:buNone/>
+            </a:pPr>
+            <a:r>
+              <a:rPr lang="ru-RU" sz="1600" dirty="0">
+                <a:effectLst/>
+                <a:latin typeface="Times New Roman" panose="02020603050405020304" pitchFamily="18" charset="0"/>
+                <a:ea typeface="Times New Roman" panose="02020603050405020304" pitchFamily="18" charset="0"/>
+              </a:rPr>
+              <a:t>Подсистема приложения предназначена для ввода информации о заказах на определённый товар.</a:t>
+            </a:r>
+            <a:endParaRPr lang="ru-RU" sz="1600" dirty="0">
+              <a:effectLst/>
+              <a:latin typeface="Arial" panose="020B0604020202020204" pitchFamily="34" charset="0"/>
+              <a:ea typeface="Arial" panose="020B0604020202020204" pitchFamily="34" charset="0"/>
+            </a:endParaRPr>
+          </a:p>
+        </p:txBody>
+      </p:sp>
+    </p:spTree>
+    <p:extLst>
+      <p:ext uri="{BB962C8B-B14F-4D97-AF65-F5344CB8AC3E}">
+        <p14:creationId xmlns:p14="http://schemas.microsoft.com/office/powerpoint/2010/main" val="2313837816"/>
+      </p:ext>
+    </p:extLst>
+  </p:cSld>
+  <p:clrMapOvr>
+    <a:masterClrMapping/>
+  </p:clrMapOvr>
+</p:sld>
+</file>
+
+<file path=ppt/slides/slide11.xml><?xml version="1.0" encoding="utf-8"?>
+<p:sld xmlns:a="http://schemas.openxmlformats.org/drawingml/2006/main" xmlns:r="http://schemas.openxmlformats.org/officeDocument/2006/relationships" xmlns:p="http://schemas.openxmlformats.org/presentationml/2006/main">
+  <p:cSld>
+    <p:spTree>
+      <p:nvGrpSpPr>
+        <p:cNvPr id="1" name=""/>
+        <p:cNvGrpSpPr/>
+        <p:nvPr/>
+      </p:nvGrpSpPr>
+      <p:grpSpPr>
+        <a:xfrm>
+          <a:off x="0" y="0"/>
+          <a:ext cx="0" cy="0"/>
+          <a:chOff x="0" y="0"/>
+          <a:chExt cx="0" cy="0"/>
+        </a:xfrm>
+      </p:grpSpPr>
+      <p:sp>
+        <p:nvSpPr>
+          <p:cNvPr id="2" name="Заголовок 1">
+            <a:extLst>
+              <a:ext uri="{FF2B5EF4-FFF2-40B4-BE49-F238E27FC236}">
+                <a16:creationId xmlns:a16="http://schemas.microsoft.com/office/drawing/2014/main" id="{A1418FED-D9F9-4900-A4FA-6EB249DDA024}"/>
+              </a:ext>
+            </a:extLst>
+          </p:cNvPr>
+          <p:cNvSpPr>
+            <a:spLocks noGrp="1"/>
+          </p:cNvSpPr>
+          <p:nvPr>
+            <p:ph type="title"/>
+          </p:nvPr>
+        </p:nvSpPr>
+        <p:spPr>
+          <a:xfrm>
+            <a:off x="1451579" y="548840"/>
+            <a:ext cx="9603275" cy="1466892"/>
+          </a:xfrm>
+        </p:spPr>
+        <p:txBody>
+          <a:bodyPr>
+            <a:normAutofit/>
+          </a:bodyPr>
+          <a:lstStyle/>
+          <a:p>
+            <a:pPr algn="ctr"/>
+            <a:r>
+              <a:rPr lang="ru-RU" sz="4000" dirty="0">
+                <a:latin typeface="Times New Roman" panose="02020603050405020304" pitchFamily="18" charset="0"/>
+                <a:cs typeface="Times New Roman" panose="02020603050405020304" pitchFamily="18" charset="0"/>
+              </a:rPr>
+              <a:t>Проектирование базы данных информационной системы</a:t>
+            </a:r>
+            <a:endParaRPr lang="ru-RU" sz="4000" dirty="0"/>
+          </a:p>
+        </p:txBody>
+      </p:sp>
+      <p:sp>
+        <p:nvSpPr>
+          <p:cNvPr id="3" name="Объект 2">
+            <a:extLst>
+              <a:ext uri="{FF2B5EF4-FFF2-40B4-BE49-F238E27FC236}">
+                <a16:creationId xmlns:a16="http://schemas.microsoft.com/office/drawing/2014/main" id="{E0422C1F-0A0A-41C0-B15D-B05CB64FC6AE}"/>
+              </a:ext>
+            </a:extLst>
+          </p:cNvPr>
+          <p:cNvSpPr>
+            <a:spLocks noGrp="1"/>
+          </p:cNvSpPr>
+          <p:nvPr>
+            <p:ph idx="1"/>
+          </p:nvPr>
+        </p:nvSpPr>
+        <p:spPr>
+          <a:xfrm>
+            <a:off x="111760" y="1806424"/>
+            <a:ext cx="6485069" cy="4606614"/>
+          </a:xfrm>
+        </p:spPr>
+        <p:txBody>
+          <a:bodyPr>
+            <a:normAutofit/>
+          </a:bodyPr>
+          <a:lstStyle/>
+          <a:p>
+            <a:pPr marL="0" indent="0" algn="just">
+              <a:lnSpc>
+                <a:spcPct val="150000"/>
+              </a:lnSpc>
+              <a:spcAft>
+                <a:spcPts val="0"/>
+              </a:spcAft>
+              <a:buNone/>
+            </a:pPr>
+            <a:r>
+              <a:rPr lang="ru-RU" sz="1800" dirty="0">
+                <a:effectLst/>
+                <a:latin typeface="Times New Roman" panose="02020603050405020304" pitchFamily="18" charset="0"/>
+                <a:ea typeface="Times New Roman" panose="02020603050405020304" pitchFamily="18" charset="0"/>
+              </a:rPr>
+              <a:t>При проектировании модели интернет - магазина применяется метод семантического моделирования. В качестве инструмента семантического моделирования используется диаграмма «сущность-связь» (Entity-Relationship Diagrams, ER - диаграмма).</a:t>
+            </a:r>
+          </a:p>
+          <a:p>
+            <a:pPr marL="0" indent="0" algn="just">
+              <a:lnSpc>
+                <a:spcPct val="150000"/>
+              </a:lnSpc>
+              <a:buNone/>
+            </a:pPr>
+            <a:r>
+              <a:rPr lang="ru-RU" sz="1800" dirty="0">
+                <a:effectLst/>
+                <a:latin typeface="Times New Roman" panose="02020603050405020304" pitchFamily="18" charset="0"/>
+                <a:ea typeface="Times New Roman" panose="02020603050405020304" pitchFamily="18" charset="0"/>
+              </a:rPr>
+              <a:t>ER - диаграммы используются для разработки данных и представляют собой стандартный способ определения данных и отношений между ними. Таким образом, осуществляется детализация хранилищ данных. Основными понятиями ER-диаграммы являются сущность, связь, атрибут.</a:t>
+            </a:r>
+            <a:endParaRPr lang="ru-RU" sz="1800" dirty="0">
+              <a:effectLst/>
+              <a:latin typeface="Arial" panose="020B0604020202020204" pitchFamily="34" charset="0"/>
+              <a:ea typeface="Arial" panose="020B0604020202020204" pitchFamily="34" charset="0"/>
+            </a:endParaRPr>
+          </a:p>
+          <a:p>
+            <a:pPr marL="0" indent="0" algn="just">
+              <a:lnSpc>
+                <a:spcPct val="150000"/>
+              </a:lnSpc>
+              <a:spcAft>
+                <a:spcPts val="0"/>
+              </a:spcAft>
+              <a:buNone/>
+            </a:pPr>
+            <a:endParaRPr lang="ru-RU" sz="1800" dirty="0">
+              <a:effectLst/>
+              <a:latin typeface="Arial" panose="020B0604020202020204" pitchFamily="34" charset="0"/>
+              <a:ea typeface="Arial" panose="020B0604020202020204" pitchFamily="34" charset="0"/>
+            </a:endParaRPr>
+          </a:p>
+        </p:txBody>
+      </p:sp>
+      <p:pic>
+        <p:nvPicPr>
+          <p:cNvPr id="6" name="Рисунок 5">
+            <a:extLst>
+              <a:ext uri="{FF2B5EF4-FFF2-40B4-BE49-F238E27FC236}">
+                <a16:creationId xmlns:a16="http://schemas.microsoft.com/office/drawing/2014/main" id="{054C2585-FB31-49DD-9B04-AB7CC7339C0C}"/>
+              </a:ext>
+            </a:extLst>
+          </p:cNvPr>
+          <p:cNvPicPr>
+            <a:picLocks noChangeAspect="1"/>
+          </p:cNvPicPr>
+          <p:nvPr/>
+        </p:nvPicPr>
+        <p:blipFill>
+          <a:blip r:embed="rId2"/>
+          <a:stretch>
+            <a:fillRect/>
+          </a:stretch>
+        </p:blipFill>
+        <p:spPr>
+          <a:xfrm>
+            <a:off x="7030720" y="2241486"/>
+            <a:ext cx="4718434" cy="3214433"/>
+          </a:xfrm>
+          <a:prstGeom prst="rect">
+            <a:avLst/>
+          </a:prstGeom>
+        </p:spPr>
+      </p:pic>
+    </p:spTree>
+    <p:extLst>
+      <p:ext uri="{BB962C8B-B14F-4D97-AF65-F5344CB8AC3E}">
+        <p14:creationId xmlns:p14="http://schemas.microsoft.com/office/powerpoint/2010/main" val="382834049"/>
+      </p:ext>
+    </p:extLst>
+  </p:cSld>
+  <p:clrMapOvr>
+    <a:masterClrMapping/>
+  </p:clrMapOvr>
+</p:sld>
+</file>
+
+<file path=ppt/slides/slide12.xml><?xml version="1.0" encoding="utf-8"?>
+<p:sld xmlns:a="http://schemas.openxmlformats.org/drawingml/2006/main" xmlns:r="http://schemas.openxmlformats.org/officeDocument/2006/relationships" xmlns:p="http://schemas.openxmlformats.org/presentationml/2006/main">
+  <p:cSld>
+    <p:spTree>
+      <p:nvGrpSpPr>
+        <p:cNvPr id="1" name=""/>
+        <p:cNvGrpSpPr/>
+        <p:nvPr/>
+      </p:nvGrpSpPr>
+      <p:grpSpPr>
+        <a:xfrm>
+          <a:off x="0" y="0"/>
+          <a:ext cx="0" cy="0"/>
+          <a:chOff x="0" y="0"/>
+          <a:chExt cx="0" cy="0"/>
+        </a:xfrm>
+      </p:grpSpPr>
+      <p:sp>
+        <p:nvSpPr>
+          <p:cNvPr id="2" name="Заголовок 1">
+            <a:extLst>
+              <a:ext uri="{FF2B5EF4-FFF2-40B4-BE49-F238E27FC236}">
+                <a16:creationId xmlns:a16="http://schemas.microsoft.com/office/drawing/2014/main" id="{A1418FED-D9F9-4900-A4FA-6EB249DDA024}"/>
+              </a:ext>
+            </a:extLst>
+          </p:cNvPr>
+          <p:cNvSpPr>
+            <a:spLocks noGrp="1"/>
+          </p:cNvSpPr>
+          <p:nvPr>
+            <p:ph type="title"/>
+          </p:nvPr>
+        </p:nvSpPr>
+        <p:spPr>
+          <a:xfrm>
+            <a:off x="1451579" y="548840"/>
+            <a:ext cx="9603275" cy="1466892"/>
+          </a:xfrm>
+        </p:spPr>
+        <p:txBody>
+          <a:bodyPr>
+            <a:normAutofit/>
+          </a:bodyPr>
+          <a:lstStyle/>
+          <a:p>
+            <a:pPr algn="ctr"/>
+            <a:r>
+              <a:rPr lang="ru-RU" sz="4000" dirty="0">
+                <a:latin typeface="Times New Roman" panose="02020603050405020304" pitchFamily="18" charset="0"/>
+                <a:cs typeface="Times New Roman" panose="02020603050405020304" pitchFamily="18" charset="0"/>
+              </a:rPr>
+              <a:t>Проектирование базы данных информационной системы</a:t>
+            </a:r>
+            <a:endParaRPr lang="ru-RU" sz="4000" dirty="0"/>
+          </a:p>
+        </p:txBody>
+      </p:sp>
+      <p:sp>
+        <p:nvSpPr>
+          <p:cNvPr id="3" name="Объект 2">
+            <a:extLst>
+              <a:ext uri="{FF2B5EF4-FFF2-40B4-BE49-F238E27FC236}">
+                <a16:creationId xmlns:a16="http://schemas.microsoft.com/office/drawing/2014/main" id="{E0422C1F-0A0A-41C0-B15D-B05CB64FC6AE}"/>
+              </a:ext>
+            </a:extLst>
+          </p:cNvPr>
+          <p:cNvSpPr>
+            <a:spLocks noGrp="1"/>
+          </p:cNvSpPr>
+          <p:nvPr>
+            <p:ph idx="1"/>
+          </p:nvPr>
+        </p:nvSpPr>
+        <p:spPr>
+          <a:xfrm>
+            <a:off x="5648960" y="2171984"/>
+            <a:ext cx="6217920" cy="4137176"/>
+          </a:xfrm>
+        </p:spPr>
+        <p:txBody>
+          <a:bodyPr>
+            <a:normAutofit/>
+          </a:bodyPr>
+          <a:lstStyle/>
+          <a:p>
+            <a:pPr marL="0" indent="0" algn="just">
+              <a:lnSpc>
+                <a:spcPct val="150000"/>
+              </a:lnSpc>
+              <a:buNone/>
+            </a:pPr>
+            <a:r>
+              <a:rPr lang="ru-RU" dirty="0">
+                <a:effectLst/>
+                <a:latin typeface="Times New Roman" panose="02020603050405020304" pitchFamily="18" charset="0"/>
+                <a:ea typeface="Times New Roman" panose="02020603050405020304" pitchFamily="18" charset="0"/>
+              </a:rPr>
+              <a:t>Ключ сущности - это не избыточный набор атрибутов, значения которых в совокупности являются уникальными для каждого экземпляра сущности. Неизбыточность заключается в том, что при удалении любого атрибута из ключа, нарушается его уникальность. Сущность может иметь несколько различных ключей. Ключевые атрибуты изображаются на диаграмме подчеркиванием.</a:t>
+            </a:r>
+            <a:endParaRPr lang="ru-RU" dirty="0">
+              <a:effectLst/>
+              <a:latin typeface="Arial" panose="020B0604020202020204" pitchFamily="34" charset="0"/>
+              <a:ea typeface="Arial" panose="020B0604020202020204" pitchFamily="34" charset="0"/>
+            </a:endParaRPr>
+          </a:p>
+          <a:p>
+            <a:pPr marL="0" indent="0" algn="just">
+              <a:lnSpc>
+                <a:spcPct val="150000"/>
+              </a:lnSpc>
+              <a:spcAft>
+                <a:spcPts val="0"/>
+              </a:spcAft>
+              <a:buNone/>
+            </a:pPr>
+            <a:endParaRPr lang="ru-RU" sz="1800" dirty="0">
+              <a:effectLst/>
+              <a:latin typeface="Arial" panose="020B0604020202020204" pitchFamily="34" charset="0"/>
+              <a:ea typeface="Arial" panose="020B0604020202020204" pitchFamily="34" charset="0"/>
+            </a:endParaRPr>
+          </a:p>
+        </p:txBody>
+      </p:sp>
+      <p:pic>
+        <p:nvPicPr>
+          <p:cNvPr id="5" name="Рисунок 4">
+            <a:extLst>
+              <a:ext uri="{FF2B5EF4-FFF2-40B4-BE49-F238E27FC236}">
+                <a16:creationId xmlns:a16="http://schemas.microsoft.com/office/drawing/2014/main" id="{982DA726-3D7D-4BC3-87DD-EA257A94FCE1}"/>
+              </a:ext>
+            </a:extLst>
+          </p:cNvPr>
+          <p:cNvPicPr/>
+          <p:nvPr/>
+        </p:nvPicPr>
+        <p:blipFill>
+          <a:blip r:embed="rId2">
+            <a:extLst>
+              <a:ext uri="{28A0092B-C50C-407E-A947-70E740481C1C}">
+                <a14:useLocalDpi xmlns:a14="http://schemas.microsoft.com/office/drawing/2010/main" val="0"/>
+              </a:ext>
+            </a:extLst>
+          </a:blip>
+          <a:srcRect/>
+          <a:stretch>
+            <a:fillRect/>
+          </a:stretch>
+        </p:blipFill>
+        <p:spPr bwMode="auto">
+          <a:xfrm>
+            <a:off x="81280" y="2015732"/>
+            <a:ext cx="5496560" cy="3862856"/>
+          </a:xfrm>
+          <a:prstGeom prst="rect">
+            <a:avLst/>
+          </a:prstGeom>
+          <a:noFill/>
+          <a:ln>
+            <a:noFill/>
+          </a:ln>
+        </p:spPr>
+      </p:pic>
+    </p:spTree>
+    <p:extLst>
+      <p:ext uri="{BB962C8B-B14F-4D97-AF65-F5344CB8AC3E}">
+        <p14:creationId xmlns:p14="http://schemas.microsoft.com/office/powerpoint/2010/main" val="3234329190"/>
+      </p:ext>
+    </p:extLst>
+  </p:cSld>
+  <p:clrMapOvr>
+    <a:masterClrMapping/>
+  </p:clrMapOvr>
+</p:sld>
+</file>
+
+<file path=ppt/slides/slide13.xml><?xml version="1.0" encoding="utf-8"?>
+<p:sld xmlns:a="http://schemas.openxmlformats.org/drawingml/2006/main" xmlns:r="http://schemas.openxmlformats.org/officeDocument/2006/relationships" xmlns:p="http://schemas.openxmlformats.org/presentationml/2006/main">
+  <p:cSld>
+    <p:spTree>
+      <p:nvGrpSpPr>
+        <p:cNvPr id="1" name=""/>
+        <p:cNvGrpSpPr/>
+        <p:nvPr/>
+      </p:nvGrpSpPr>
+      <p:grpSpPr>
+        <a:xfrm>
+          <a:off x="0" y="0"/>
+          <a:ext cx="0" cy="0"/>
+          <a:chOff x="0" y="0"/>
+          <a:chExt cx="0" cy="0"/>
+        </a:xfrm>
+      </p:grpSpPr>
+      <p:sp>
+        <p:nvSpPr>
+          <p:cNvPr id="2" name="Заголовок 1">
+            <a:extLst>
+              <a:ext uri="{FF2B5EF4-FFF2-40B4-BE49-F238E27FC236}">
+                <a16:creationId xmlns:a16="http://schemas.microsoft.com/office/drawing/2014/main" id="{24FF08CC-A0ED-4831-95F3-1E4DC5B26D04}"/>
+              </a:ext>
+            </a:extLst>
+          </p:cNvPr>
+          <p:cNvSpPr>
+            <a:spLocks noGrp="1"/>
+          </p:cNvSpPr>
+          <p:nvPr>
+            <p:ph type="title"/>
+          </p:nvPr>
+        </p:nvSpPr>
+        <p:spPr/>
+        <p:txBody>
+          <a:bodyPr/>
+          <a:lstStyle/>
+          <a:p>
+            <a:endParaRPr lang="ru-RU" dirty="0"/>
+          </a:p>
+        </p:txBody>
+      </p:sp>
+      <p:sp>
+        <p:nvSpPr>
+          <p:cNvPr id="3" name="Объект 2">
+            <a:extLst>
+              <a:ext uri="{FF2B5EF4-FFF2-40B4-BE49-F238E27FC236}">
+                <a16:creationId xmlns:a16="http://schemas.microsoft.com/office/drawing/2014/main" id="{4F83F06A-EB2C-48C9-A1FD-69C965A13285}"/>
+              </a:ext>
+            </a:extLst>
+          </p:cNvPr>
+          <p:cNvSpPr>
+            <a:spLocks noGrp="1"/>
+          </p:cNvSpPr>
+          <p:nvPr>
+            <p:ph idx="1"/>
+          </p:nvPr>
+        </p:nvSpPr>
+        <p:spPr/>
+        <p:txBody>
+          <a:bodyPr/>
+          <a:lstStyle/>
+          <a:p>
+            <a:endParaRPr lang="ru-RU"/>
+          </a:p>
+        </p:txBody>
+      </p:sp>
+    </p:spTree>
+    <p:extLst>
+      <p:ext uri="{BB962C8B-B14F-4D97-AF65-F5344CB8AC3E}">
+        <p14:creationId xmlns:p14="http://schemas.microsoft.com/office/powerpoint/2010/main" val="3866677030"/>
       </p:ext>
     </p:extLst>
   </p:cSld>
@@ -5158,13 +5821,13 @@
         </p:nvSpPr>
         <p:spPr>
           <a:xfrm>
-            <a:off x="314440" y="1916273"/>
-            <a:ext cx="10866444" cy="4323521"/>
+            <a:off x="112216" y="1916273"/>
+            <a:ext cx="8011875" cy="4238342"/>
           </a:xfrm>
         </p:spPr>
         <p:txBody>
           <a:bodyPr>
-            <a:normAutofit fontScale="77500" lnSpcReduction="20000"/>
+            <a:normAutofit fontScale="85000" lnSpcReduction="10000"/>
           </a:bodyPr>
           <a:lstStyle/>
           <a:p>
@@ -5202,7 +5865,7 @@
                 <a:latin typeface="Times New Roman" panose="02020603050405020304" pitchFamily="18" charset="0"/>
                 <a:ea typeface="Times New Roman" panose="02020603050405020304" pitchFamily="18" charset="0"/>
               </a:rPr>
-              <a:t>Полное наименование системы и ее условное обозначение</a:t>
+              <a:t>Наименование разрабатываемой системы - Автоматизация работы музыкального магазина. Далее используется название магазин «Музторг» или сокращение системы АРММ.</a:t>
             </a:r>
             <a:endParaRPr lang="ru-RU" sz="1800" dirty="0">
               <a:effectLst/>
@@ -5211,13 +5874,14 @@
             </a:endParaRPr>
           </a:p>
           <a:p>
-            <a:pPr indent="457200" algn="just">
+            <a:pPr indent="0" algn="just">
               <a:lnSpc>
                 <a:spcPct val="150000"/>
               </a:lnSpc>
               <a:spcAft>
                 <a:spcPts val="0"/>
               </a:spcAft>
+              <a:buNone/>
             </a:pPr>
             <a:r>
               <a:rPr lang="ru-RU" sz="1800" dirty="0">
@@ -5225,7 +5889,7 @@
                 <a:latin typeface="Times New Roman" panose="02020603050405020304" pitchFamily="18" charset="0"/>
                 <a:ea typeface="Times New Roman" panose="02020603050405020304" pitchFamily="18" charset="0"/>
               </a:rPr>
-              <a:t>Наименование разрабатываемой системы - Автоматизация работы музыкального магазина. Далее используется название магазин «Музторг» или сокращение системы АРММ.</a:t>
+              <a:t>Наименование компаний разработчика и заказчика (пользователя) системы и их реквизиты</a:t>
             </a:r>
             <a:endParaRPr lang="ru-RU" sz="1800" dirty="0">
               <a:effectLst/>
@@ -5234,13 +5898,14 @@
             </a:endParaRPr>
           </a:p>
           <a:p>
-            <a:pPr indent="457200" algn="just">
+            <a:pPr indent="0" algn="just">
               <a:lnSpc>
                 <a:spcPct val="150000"/>
               </a:lnSpc>
               <a:spcAft>
                 <a:spcPts val="0"/>
               </a:spcAft>
+              <a:buNone/>
             </a:pPr>
             <a:r>
               <a:rPr lang="ru-RU" sz="1800" dirty="0">
@@ -5248,7 +5913,7 @@
                 <a:latin typeface="Times New Roman" panose="02020603050405020304" pitchFamily="18" charset="0"/>
                 <a:ea typeface="Times New Roman" panose="02020603050405020304" pitchFamily="18" charset="0"/>
               </a:rPr>
-              <a:t>1.2 Наименование компаний разработчика и заказчика (пользователя) системы и их реквизиты</a:t>
+              <a:t>Заказчик</a:t>
             </a:r>
             <a:endParaRPr lang="ru-RU" sz="1800" dirty="0">
               <a:effectLst/>
@@ -5257,13 +5922,14 @@
             </a:endParaRPr>
           </a:p>
           <a:p>
-            <a:pPr indent="457200" algn="just">
+            <a:pPr indent="0" algn="just">
               <a:lnSpc>
                 <a:spcPct val="150000"/>
               </a:lnSpc>
               <a:spcAft>
                 <a:spcPts val="0"/>
               </a:spcAft>
+              <a:buNone/>
             </a:pPr>
             <a:r>
               <a:rPr lang="ru-RU" sz="1800" dirty="0">
@@ -5271,7 +5937,7 @@
                 <a:latin typeface="Times New Roman" panose="02020603050405020304" pitchFamily="18" charset="0"/>
                 <a:ea typeface="Times New Roman" panose="02020603050405020304" pitchFamily="18" charset="0"/>
               </a:rPr>
-              <a:t>Заказчик</a:t>
+              <a:t>ООО «Музыкант»</a:t>
             </a:r>
             <a:endParaRPr lang="ru-RU" sz="1800" dirty="0">
               <a:effectLst/>
@@ -5280,13 +5946,14 @@
             </a:endParaRPr>
           </a:p>
           <a:p>
-            <a:pPr indent="457200" algn="just">
+            <a:pPr indent="0" algn="just">
               <a:lnSpc>
                 <a:spcPct val="150000"/>
               </a:lnSpc>
               <a:spcAft>
                 <a:spcPts val="0"/>
               </a:spcAft>
+              <a:buNone/>
             </a:pPr>
             <a:r>
               <a:rPr lang="ru-RU" sz="1800" dirty="0">
@@ -5294,7 +5961,7 @@
                 <a:latin typeface="Times New Roman" panose="02020603050405020304" pitchFamily="18" charset="0"/>
                 <a:ea typeface="Times New Roman" panose="02020603050405020304" pitchFamily="18" charset="0"/>
               </a:rPr>
-              <a:t>ООО «Музыкант»</a:t>
+              <a:t>Адрес: г. Курск, ул. Ленина, 86.</a:t>
             </a:r>
             <a:endParaRPr lang="ru-RU" sz="1800" dirty="0">
               <a:effectLst/>
@@ -5303,13 +5970,14 @@
             </a:endParaRPr>
           </a:p>
           <a:p>
-            <a:pPr indent="457200" algn="just">
+            <a:pPr indent="0" algn="just">
               <a:lnSpc>
                 <a:spcPct val="150000"/>
               </a:lnSpc>
               <a:spcAft>
                 <a:spcPts val="0"/>
               </a:spcAft>
+              <a:buNone/>
             </a:pPr>
             <a:r>
               <a:rPr lang="ru-RU" sz="1800" dirty="0">
@@ -5317,7 +5985,7 @@
                 <a:latin typeface="Times New Roman" panose="02020603050405020304" pitchFamily="18" charset="0"/>
                 <a:ea typeface="Times New Roman" panose="02020603050405020304" pitchFamily="18" charset="0"/>
               </a:rPr>
-              <a:t>Адрес: г. Курск, ул. Ленина, 86.</a:t>
+              <a:t>Исполнитель работ (разработчик)</a:t>
             </a:r>
             <a:endParaRPr lang="ru-RU" sz="1800" dirty="0">
               <a:effectLst/>
@@ -5326,13 +5994,14 @@
             </a:endParaRPr>
           </a:p>
           <a:p>
-            <a:pPr indent="457200" algn="just">
+            <a:pPr indent="0" algn="just">
               <a:lnSpc>
                 <a:spcPct val="150000"/>
               </a:lnSpc>
               <a:spcAft>
                 <a:spcPts val="0"/>
               </a:spcAft>
+              <a:buNone/>
             </a:pPr>
             <a:r>
               <a:rPr lang="ru-RU" sz="1800" dirty="0">
@@ -5340,7 +6009,7 @@
                 <a:latin typeface="Times New Roman" panose="02020603050405020304" pitchFamily="18" charset="0"/>
                 <a:ea typeface="Times New Roman" panose="02020603050405020304" pitchFamily="18" charset="0"/>
               </a:rPr>
-              <a:t>Исполнитель работ (разработчик)</a:t>
+              <a:t>Малышев Антон Александрович, студент специальности 09.02.04 Информационные системы (по отраслям), Курского Регионального Открытого Социального Техникума.</a:t>
             </a:r>
             <a:endParaRPr lang="ru-RU" sz="1800" dirty="0">
               <a:effectLst/>
@@ -5349,33 +6018,40 @@
             </a:endParaRPr>
           </a:p>
           <a:p>
-            <a:pPr indent="457200" algn="just">
-              <a:lnSpc>
-                <a:spcPct val="150000"/>
-              </a:lnSpc>
-              <a:spcAft>
-                <a:spcPts val="0"/>
-              </a:spcAft>
-            </a:pPr>
-            <a:r>
-              <a:rPr lang="ru-RU" sz="1800" dirty="0">
-                <a:effectLst/>
-                <a:latin typeface="Times New Roman" panose="02020603050405020304" pitchFamily="18" charset="0"/>
-                <a:ea typeface="Times New Roman" panose="02020603050405020304" pitchFamily="18" charset="0"/>
-              </a:rPr>
-              <a:t>Малышев Антон Александрович, студент специальности 09.02.04 Информационные системы (по отраслям), Курского Регионального Открытого Социального Техникума.</a:t>
-            </a:r>
-            <a:endParaRPr lang="ru-RU" sz="1800" dirty="0">
-              <a:effectLst/>
-              <a:latin typeface="Arial" panose="020B0604020202020204" pitchFamily="34" charset="0"/>
-              <a:ea typeface="Arial" panose="020B0604020202020204" pitchFamily="34" charset="0"/>
-            </a:endParaRPr>
-          </a:p>
-          <a:p>
             <a:endParaRPr lang="ru-RU" dirty="0"/>
           </a:p>
         </p:txBody>
       </p:sp>
+      <p:pic>
+        <p:nvPicPr>
+          <p:cNvPr id="5" name="Рисунок 4">
+            <a:extLst>
+              <a:ext uri="{FF2B5EF4-FFF2-40B4-BE49-F238E27FC236}">
+                <a16:creationId xmlns:a16="http://schemas.microsoft.com/office/drawing/2014/main" id="{2C8F60FC-FB5B-4FFD-8ED4-5D04D173E8E4}"/>
+              </a:ext>
+            </a:extLst>
+          </p:cNvPr>
+          <p:cNvPicPr>
+            <a:picLocks noChangeAspect="1"/>
+          </p:cNvPicPr>
+          <p:nvPr/>
+        </p:nvPicPr>
+        <p:blipFill>
+          <a:blip r:embed="rId2"/>
+          <a:stretch>
+            <a:fillRect/>
+          </a:stretch>
+        </p:blipFill>
+        <p:spPr>
+          <a:xfrm>
+            <a:off x="8229599" y="2474868"/>
+            <a:ext cx="3121152" cy="3121152"/>
+          </a:xfrm>
+          <a:prstGeom prst="rect">
+            <a:avLst/>
+          </a:prstGeom>
+        </p:spPr>
+      </p:pic>
     </p:spTree>
     <p:extLst>
       <p:ext uri="{BB962C8B-B14F-4D97-AF65-F5344CB8AC3E}">
@@ -5422,12 +6098,27 @@
             <p:ph type="title"/>
           </p:nvPr>
         </p:nvSpPr>
-        <p:spPr/>
-        <p:txBody>
-          <a:bodyPr/>
-          <a:lstStyle/>
-          <a:p>
-            <a:endParaRPr lang="ru-RU"/>
+        <p:spPr>
+          <a:xfrm>
+            <a:off x="1451579" y="548840"/>
+            <a:ext cx="9603275" cy="1466892"/>
+          </a:xfrm>
+        </p:spPr>
+        <p:txBody>
+          <a:bodyPr>
+            <a:normAutofit/>
+          </a:bodyPr>
+          <a:lstStyle/>
+          <a:p>
+            <a:pPr algn="ctr"/>
+            <a:r>
+              <a:rPr lang="ru-RU" sz="4000" dirty="0">
+                <a:latin typeface="Times New Roman" panose="02020603050405020304" pitchFamily="18" charset="0"/>
+                <a:cs typeface="Times New Roman" panose="02020603050405020304" pitchFamily="18" charset="0"/>
+              </a:rPr>
+              <a:t>Составление технического задания</a:t>
+            </a:r>
+            <a:endParaRPr lang="ru-RU" sz="4000" dirty="0"/>
           </a:p>
         </p:txBody>
       </p:sp>
@@ -5447,15 +6138,200 @@
             <p:ph idx="1"/>
           </p:nvPr>
         </p:nvSpPr>
-        <p:spPr/>
+        <p:spPr>
+          <a:xfrm>
+            <a:off x="432995" y="2119489"/>
+            <a:ext cx="7192790" cy="3452907"/>
+          </a:xfrm>
+        </p:spPr>
         <p:txBody>
           <a:bodyPr/>
           <a:lstStyle/>
           <a:p>
-            <a:endParaRPr lang="ru-RU"/>
-          </a:p>
-        </p:txBody>
-      </p:sp>
+            <a:pPr indent="0" algn="just">
+              <a:lnSpc>
+                <a:spcPct val="150000"/>
+              </a:lnSpc>
+              <a:spcAft>
+                <a:spcPts val="0"/>
+              </a:spcAft>
+              <a:buNone/>
+            </a:pPr>
+            <a:r>
+              <a:rPr lang="ru-RU" sz="1800" dirty="0">
+                <a:effectLst/>
+                <a:latin typeface="Times New Roman" panose="02020603050405020304" pitchFamily="18" charset="0"/>
+                <a:ea typeface="Times New Roman" panose="02020603050405020304" pitchFamily="18" charset="0"/>
+              </a:rPr>
+              <a:t>Система АРММ состоит из следующих подсистем;</a:t>
+            </a:r>
+            <a:endParaRPr lang="ru-RU" sz="1800" dirty="0">
+              <a:effectLst/>
+              <a:latin typeface="Arial" panose="020B0604020202020204" pitchFamily="34" charset="0"/>
+              <a:ea typeface="Arial" panose="020B0604020202020204" pitchFamily="34" charset="0"/>
+            </a:endParaRPr>
+          </a:p>
+          <a:p>
+            <a:pPr indent="0" algn="just">
+              <a:lnSpc>
+                <a:spcPct val="150000"/>
+              </a:lnSpc>
+              <a:spcAft>
+                <a:spcPts val="0"/>
+              </a:spcAft>
+              <a:buNone/>
+            </a:pPr>
+            <a:r>
+              <a:rPr lang="ru-RU" sz="1800" dirty="0">
+                <a:effectLst/>
+                <a:latin typeface="Times New Roman" panose="02020603050405020304" pitchFamily="18" charset="0"/>
+                <a:ea typeface="Times New Roman" panose="02020603050405020304" pitchFamily="18" charset="0"/>
+              </a:rPr>
+              <a:t>-	подсистема сбора и загрузки данных;</a:t>
+            </a:r>
+            <a:endParaRPr lang="ru-RU" sz="1800" dirty="0">
+              <a:effectLst/>
+              <a:latin typeface="Arial" panose="020B0604020202020204" pitchFamily="34" charset="0"/>
+              <a:ea typeface="Arial" panose="020B0604020202020204" pitchFamily="34" charset="0"/>
+            </a:endParaRPr>
+          </a:p>
+          <a:p>
+            <a:pPr indent="0" algn="just">
+              <a:lnSpc>
+                <a:spcPct val="150000"/>
+              </a:lnSpc>
+              <a:spcAft>
+                <a:spcPts val="0"/>
+              </a:spcAft>
+              <a:buNone/>
+            </a:pPr>
+            <a:r>
+              <a:rPr lang="ru-RU" sz="1800" dirty="0">
+                <a:effectLst/>
+                <a:latin typeface="Times New Roman" panose="02020603050405020304" pitchFamily="18" charset="0"/>
+                <a:ea typeface="Times New Roman" panose="02020603050405020304" pitchFamily="18" charset="0"/>
+              </a:rPr>
+              <a:t>-	подсистема хранения данных;</a:t>
+            </a:r>
+            <a:endParaRPr lang="ru-RU" sz="1800" dirty="0">
+              <a:effectLst/>
+              <a:latin typeface="Arial" panose="020B0604020202020204" pitchFamily="34" charset="0"/>
+              <a:ea typeface="Arial" panose="020B0604020202020204" pitchFamily="34" charset="0"/>
+            </a:endParaRPr>
+          </a:p>
+          <a:p>
+            <a:pPr indent="0" algn="just">
+              <a:lnSpc>
+                <a:spcPct val="150000"/>
+              </a:lnSpc>
+              <a:spcAft>
+                <a:spcPts val="0"/>
+              </a:spcAft>
+              <a:buNone/>
+            </a:pPr>
+            <a:r>
+              <a:rPr lang="ru-RU" sz="1800" dirty="0">
+                <a:effectLst/>
+                <a:latin typeface="Times New Roman" panose="02020603050405020304" pitchFamily="18" charset="0"/>
+                <a:ea typeface="Times New Roman" panose="02020603050405020304" pitchFamily="18" charset="0"/>
+              </a:rPr>
+              <a:t>-	подсистема формирования отчётности;</a:t>
+            </a:r>
+            <a:endParaRPr lang="ru-RU" sz="1800" dirty="0">
+              <a:effectLst/>
+              <a:latin typeface="Arial" panose="020B0604020202020204" pitchFamily="34" charset="0"/>
+              <a:ea typeface="Arial" panose="020B0604020202020204" pitchFamily="34" charset="0"/>
+            </a:endParaRPr>
+          </a:p>
+          <a:p>
+            <a:pPr indent="0" algn="just">
+              <a:lnSpc>
+                <a:spcPct val="150000"/>
+              </a:lnSpc>
+              <a:spcAft>
+                <a:spcPts val="0"/>
+              </a:spcAft>
+              <a:buNone/>
+            </a:pPr>
+            <a:r>
+              <a:rPr lang="ru-RU" sz="1800" dirty="0">
+                <a:effectLst/>
+                <a:latin typeface="Times New Roman" panose="02020603050405020304" pitchFamily="18" charset="0"/>
+                <a:ea typeface="Times New Roman" panose="02020603050405020304" pitchFamily="18" charset="0"/>
+              </a:rPr>
+              <a:t>-	подсистема анализа работы системы;</a:t>
+            </a:r>
+            <a:endParaRPr lang="ru-RU" sz="1800" dirty="0">
+              <a:effectLst/>
+              <a:latin typeface="Arial" panose="020B0604020202020204" pitchFamily="34" charset="0"/>
+              <a:ea typeface="Arial" panose="020B0604020202020204" pitchFamily="34" charset="0"/>
+            </a:endParaRPr>
+          </a:p>
+          <a:p>
+            <a:pPr indent="0" algn="just">
+              <a:lnSpc>
+                <a:spcPct val="150000"/>
+              </a:lnSpc>
+              <a:spcAft>
+                <a:spcPts val="0"/>
+              </a:spcAft>
+              <a:buNone/>
+            </a:pPr>
+            <a:r>
+              <a:rPr lang="ru-RU" sz="1800" dirty="0">
+                <a:effectLst/>
+                <a:latin typeface="Times New Roman" panose="02020603050405020304" pitchFamily="18" charset="0"/>
+                <a:ea typeface="Times New Roman" panose="02020603050405020304" pitchFamily="18" charset="0"/>
+              </a:rPr>
+              <a:t>-	подсистема приложений;</a:t>
+            </a:r>
+            <a:endParaRPr lang="ru-RU" sz="1800" dirty="0">
+              <a:effectLst/>
+              <a:latin typeface="Arial" panose="020B0604020202020204" pitchFamily="34" charset="0"/>
+              <a:ea typeface="Arial" panose="020B0604020202020204" pitchFamily="34" charset="0"/>
+            </a:endParaRPr>
+          </a:p>
+        </p:txBody>
+      </p:sp>
+      <p:pic>
+        <p:nvPicPr>
+          <p:cNvPr id="4" name="Рисунок 3">
+            <a:extLst>
+              <a:ext uri="{FF2B5EF4-FFF2-40B4-BE49-F238E27FC236}">
+                <a16:creationId xmlns:a16="http://schemas.microsoft.com/office/drawing/2014/main" id="{DEBA4E55-7E12-41FE-8981-BF0EEB7FDC31}"/>
+              </a:ext>
+            </a:extLst>
+          </p:cNvPr>
+          <p:cNvPicPr/>
+          <p:nvPr/>
+        </p:nvPicPr>
+        <p:blipFill>
+          <a:blip r:embed="rId2" cstate="print">
+            <a:extLst>
+              <a:ext uri="{28A0092B-C50C-407E-A947-70E740481C1C}">
+                <a14:useLocalDpi xmlns:a14="http://schemas.microsoft.com/office/drawing/2010/main" val="0"/>
+              </a:ext>
+            </a:extLst>
+          </a:blip>
+          <a:srcRect/>
+          <a:stretch>
+            <a:fillRect/>
+          </a:stretch>
+        </p:blipFill>
+        <p:spPr bwMode="auto">
+          <a:xfrm>
+            <a:off x="6606989" y="2223247"/>
+            <a:ext cx="5330140" cy="3245392"/>
+          </a:xfrm>
+          <a:prstGeom prst="rect">
+            <a:avLst/>
+          </a:prstGeom>
+          <a:noFill/>
+          <a:ln>
+            <a:noFill/>
+          </a:ln>
+        </p:spPr>
+      </p:pic>
     </p:spTree>
     <p:extLst>
       <p:ext uri="{BB962C8B-B14F-4D97-AF65-F5344CB8AC3E}">

</xml_diff>